<commit_message>
more images for ProCoDA
</commit_message>
<xml_diff>
--- a/ProCoDA/Images/ProCoDA.pptx
+++ b/ProCoDA/Images/ProCoDA.pptx
@@ -12,20 +12,22 @@
     <p:sldId id="263" r:id="rId6"/>
     <p:sldId id="264" r:id="rId7"/>
     <p:sldId id="265" r:id="rId8"/>
+    <p:sldId id="266" r:id="rId9"/>
+    <p:sldId id="267" r:id="rId10"/>
+    <p:sldId id="268" r:id="rId11"/>
+    <p:sldId id="269" r:id="rId12"/>
+    <p:sldId id="270" r:id="rId13"/>
+    <p:sldId id="271" r:id="rId14"/>
+    <p:sldId id="272" r:id="rId15"/>
+    <p:sldId id="273" r:id="rId16"/>
+    <p:sldId id="274" r:id="rId17"/>
   </p:sldIdLst>
   <p:sldSz cx="9144000" cy="6858000" type="screen4x3"/>
   <p:notesSz cx="6858000" cy="9144000"/>
   <p:embeddedFontLst>
     <p:embeddedFont>
-      <p:font typeface="Monotype Sorts" panose="05000000000000000000" pitchFamily="2" charset="2"/>
-      <p:regular r:id="rId9"/>
-    </p:embeddedFont>
-    <p:embeddedFont>
-      <p:font typeface="Calibri" panose="020F0502020204030204" pitchFamily="34" charset="0"/>
-      <p:regular r:id="rId10"/>
-      <p:bold r:id="rId11"/>
-      <p:italic r:id="rId12"/>
-      <p:boldItalic r:id="rId13"/>
+      <p:font typeface="Monotype Sorts" panose="020B0604020202020204"/>
+      <p:regular r:id="rId18"/>
     </p:embeddedFont>
   </p:embeddedFontLst>
   <p:defaultTextStyle>
@@ -4606,31 +4608,12 @@
       </p:grpSpPr>
       <p:sp>
         <p:nvSpPr>
-          <p:cNvPr id="2" name="Title 1"/>
+          <p:cNvPr id="5" name="Title 4"/>
           <p:cNvSpPr>
             <a:spLocks noGrp="1"/>
           </p:cNvSpPr>
           <p:nvPr>
             <p:ph type="title"/>
-          </p:nvPr>
-        </p:nvSpPr>
-        <p:spPr/>
-        <p:txBody>
-          <a:bodyPr/>
-          <a:lstStyle/>
-          <a:p>
-            <a:endParaRPr lang="en-US" dirty="0"/>
-          </a:p>
-        </p:txBody>
-      </p:sp>
-      <p:sp>
-        <p:nvSpPr>
-          <p:cNvPr id="3" name="Content Placeholder 2"/>
-          <p:cNvSpPr>
-            <a:spLocks noGrp="1"/>
-          </p:cNvSpPr>
-          <p:nvPr>
-            <p:ph idx="1"/>
           </p:nvPr>
         </p:nvSpPr>
         <p:spPr/>
@@ -4662,6 +4645,31 @@
           </a:xfrm>
           <a:prstGeom prst="rect">
             <a:avLst/>
+          </a:prstGeom>
+        </p:spPr>
+      </p:pic>
+      <p:pic>
+        <p:nvPicPr>
+          <p:cNvPr id="2" name="Picture 1"/>
+          <p:cNvPicPr>
+            <a:picLocks noChangeAspect="1"/>
+          </p:cNvPicPr>
+          <p:nvPr/>
+        </p:nvPicPr>
+        <p:blipFill rotWithShape="1">
+          <a:blip r:embed="rId3"/>
+          <a:srcRect l="8329" t="6652" r="31234" b="9330"/>
+          <a:stretch/>
+        </p:blipFill>
+        <p:spPr>
+          <a:xfrm rot="16200000">
+            <a:off x="3019246" y="1397479"/>
+            <a:ext cx="2958860" cy="7306574"/>
+          </a:xfrm>
+          <a:prstGeom prst="roundRect">
+            <a:avLst>
+              <a:gd name="adj" fmla="val 9670"/>
+            </a:avLst>
           </a:prstGeom>
         </p:spPr>
       </p:pic>
@@ -4685,6 +4693,613 @@
 </p:sld>
 </file>
 
+<file path=ppt/slides/slide10.xml><?xml version="1.0" encoding="utf-8"?>
+<p:sld xmlns:a="http://schemas.openxmlformats.org/drawingml/2006/main" xmlns:r="http://schemas.openxmlformats.org/officeDocument/2006/relationships" xmlns:p="http://schemas.openxmlformats.org/presentationml/2006/main">
+  <p:cSld>
+    <p:spTree>
+      <p:nvGrpSpPr>
+        <p:cNvPr id="1" name=""/>
+        <p:cNvGrpSpPr/>
+        <p:nvPr/>
+      </p:nvGrpSpPr>
+      <p:grpSpPr>
+        <a:xfrm>
+          <a:off x="0" y="0"/>
+          <a:ext cx="0" cy="0"/>
+          <a:chOff x="0" y="0"/>
+          <a:chExt cx="0" cy="0"/>
+        </a:xfrm>
+      </p:grpSpPr>
+      <p:sp>
+        <p:nvSpPr>
+          <p:cNvPr id="2" name="Title 1"/>
+          <p:cNvSpPr>
+            <a:spLocks noGrp="1"/>
+          </p:cNvSpPr>
+          <p:nvPr>
+            <p:ph type="title"/>
+          </p:nvPr>
+        </p:nvSpPr>
+        <p:spPr/>
+        <p:txBody>
+          <a:bodyPr/>
+          <a:lstStyle/>
+          <a:p>
+            <a:endParaRPr lang="en-US"/>
+          </a:p>
+        </p:txBody>
+      </p:sp>
+      <p:pic>
+        <p:nvPicPr>
+          <p:cNvPr id="3" name="Picture 2"/>
+          <p:cNvPicPr>
+            <a:picLocks noChangeAspect="1"/>
+          </p:cNvPicPr>
+          <p:nvPr/>
+        </p:nvPicPr>
+        <p:blipFill>
+          <a:blip r:embed="rId2"/>
+          <a:stretch>
+            <a:fillRect/>
+          </a:stretch>
+        </p:blipFill>
+        <p:spPr>
+          <a:xfrm>
+            <a:off x="133350" y="629330"/>
+            <a:ext cx="9010650" cy="5076825"/>
+          </a:xfrm>
+          <a:prstGeom prst="rect">
+            <a:avLst/>
+          </a:prstGeom>
+        </p:spPr>
+      </p:pic>
+      <p:pic>
+        <p:nvPicPr>
+          <p:cNvPr id="4" name="Picture 3"/>
+          <p:cNvPicPr>
+            <a:picLocks noChangeAspect="1"/>
+          </p:cNvPicPr>
+          <p:nvPr/>
+        </p:nvPicPr>
+        <p:blipFill rotWithShape="1">
+          <a:blip r:embed="rId2"/>
+          <a:srcRect r="36349" b="65438"/>
+          <a:stretch/>
+        </p:blipFill>
+        <p:spPr>
+          <a:xfrm>
+            <a:off x="1536247" y="4700588"/>
+            <a:ext cx="5735411" cy="1754642"/>
+          </a:xfrm>
+          <a:prstGeom prst="rect">
+            <a:avLst/>
+          </a:prstGeom>
+        </p:spPr>
+      </p:pic>
+    </p:spTree>
+    <p:extLst>
+      <p:ext uri="{BB962C8B-B14F-4D97-AF65-F5344CB8AC3E}">
+        <p14:creationId xmlns:p14="http://schemas.microsoft.com/office/powerpoint/2010/main" val="1223225003"/>
+      </p:ext>
+    </p:extLst>
+  </p:cSld>
+  <p:clrMapOvr>
+    <a:masterClrMapping/>
+  </p:clrMapOvr>
+</p:sld>
+</file>
+
+<file path=ppt/slides/slide11.xml><?xml version="1.0" encoding="utf-8"?>
+<p:sld xmlns:a="http://schemas.openxmlformats.org/drawingml/2006/main" xmlns:r="http://schemas.openxmlformats.org/officeDocument/2006/relationships" xmlns:p="http://schemas.openxmlformats.org/presentationml/2006/main">
+  <p:cSld>
+    <p:spTree>
+      <p:nvGrpSpPr>
+        <p:cNvPr id="1" name=""/>
+        <p:cNvGrpSpPr/>
+        <p:nvPr/>
+      </p:nvGrpSpPr>
+      <p:grpSpPr>
+        <a:xfrm>
+          <a:off x="0" y="0"/>
+          <a:ext cx="0" cy="0"/>
+          <a:chOff x="0" y="0"/>
+          <a:chExt cx="0" cy="0"/>
+        </a:xfrm>
+      </p:grpSpPr>
+      <p:sp>
+        <p:nvSpPr>
+          <p:cNvPr id="2" name="Title 1"/>
+          <p:cNvSpPr>
+            <a:spLocks noGrp="1"/>
+          </p:cNvSpPr>
+          <p:nvPr>
+            <p:ph type="title"/>
+          </p:nvPr>
+        </p:nvSpPr>
+        <p:spPr/>
+        <p:txBody>
+          <a:bodyPr/>
+          <a:lstStyle/>
+          <a:p>
+            <a:endParaRPr lang="en-US"/>
+          </a:p>
+        </p:txBody>
+      </p:sp>
+      <p:pic>
+        <p:nvPicPr>
+          <p:cNvPr id="3" name="Picture 2"/>
+          <p:cNvPicPr>
+            <a:picLocks noChangeAspect="1"/>
+          </p:cNvPicPr>
+          <p:nvPr/>
+        </p:nvPicPr>
+        <p:blipFill>
+          <a:blip r:embed="rId2"/>
+          <a:stretch>
+            <a:fillRect/>
+          </a:stretch>
+        </p:blipFill>
+        <p:spPr>
+          <a:xfrm>
+            <a:off x="-138113" y="-257175"/>
+            <a:ext cx="9420225" cy="7372350"/>
+          </a:xfrm>
+          <a:prstGeom prst="rect">
+            <a:avLst/>
+          </a:prstGeom>
+        </p:spPr>
+      </p:pic>
+    </p:spTree>
+    <p:extLst>
+      <p:ext uri="{BB962C8B-B14F-4D97-AF65-F5344CB8AC3E}">
+        <p14:creationId xmlns:p14="http://schemas.microsoft.com/office/powerpoint/2010/main" val="2009222905"/>
+      </p:ext>
+    </p:extLst>
+  </p:cSld>
+  <p:clrMapOvr>
+    <a:masterClrMapping/>
+  </p:clrMapOvr>
+</p:sld>
+</file>
+
+<file path=ppt/slides/slide12.xml><?xml version="1.0" encoding="utf-8"?>
+<p:sld xmlns:a="http://schemas.openxmlformats.org/drawingml/2006/main" xmlns:r="http://schemas.openxmlformats.org/officeDocument/2006/relationships" xmlns:p="http://schemas.openxmlformats.org/presentationml/2006/main">
+  <p:cSld>
+    <p:spTree>
+      <p:nvGrpSpPr>
+        <p:cNvPr id="1" name=""/>
+        <p:cNvGrpSpPr/>
+        <p:nvPr/>
+      </p:nvGrpSpPr>
+      <p:grpSpPr>
+        <a:xfrm>
+          <a:off x="0" y="0"/>
+          <a:ext cx="0" cy="0"/>
+          <a:chOff x="0" y="0"/>
+          <a:chExt cx="0" cy="0"/>
+        </a:xfrm>
+      </p:grpSpPr>
+      <p:sp>
+        <p:nvSpPr>
+          <p:cNvPr id="2" name="Title 1"/>
+          <p:cNvSpPr>
+            <a:spLocks noGrp="1"/>
+          </p:cNvSpPr>
+          <p:nvPr>
+            <p:ph type="title"/>
+          </p:nvPr>
+        </p:nvSpPr>
+        <p:spPr/>
+        <p:txBody>
+          <a:bodyPr/>
+          <a:lstStyle/>
+          <a:p>
+            <a:endParaRPr lang="en-US"/>
+          </a:p>
+        </p:txBody>
+      </p:sp>
+      <p:pic>
+        <p:nvPicPr>
+          <p:cNvPr id="3" name="Picture 2"/>
+          <p:cNvPicPr>
+            <a:picLocks noChangeAspect="1"/>
+          </p:cNvPicPr>
+          <p:nvPr/>
+        </p:nvPicPr>
+        <p:blipFill rotWithShape="1">
+          <a:blip r:embed="rId2"/>
+          <a:srcRect l="14195" t="10041" r="32051" b="71822"/>
+          <a:stretch/>
+        </p:blipFill>
+        <p:spPr>
+          <a:xfrm>
+            <a:off x="155276" y="3303917"/>
+            <a:ext cx="5063705" cy="1337095"/>
+          </a:xfrm>
+          <a:prstGeom prst="rect">
+            <a:avLst/>
+          </a:prstGeom>
+        </p:spPr>
+      </p:pic>
+      <p:pic>
+        <p:nvPicPr>
+          <p:cNvPr id="4" name="Picture 3"/>
+          <p:cNvPicPr>
+            <a:picLocks noChangeAspect="1"/>
+          </p:cNvPicPr>
+          <p:nvPr/>
+        </p:nvPicPr>
+        <p:blipFill rotWithShape="1">
+          <a:blip r:embed="rId3"/>
+          <a:srcRect l="14378" t="10275" r="32143" b="72641"/>
+          <a:stretch/>
+        </p:blipFill>
+        <p:spPr>
+          <a:xfrm>
+            <a:off x="181155" y="1776322"/>
+            <a:ext cx="5037826" cy="1259458"/>
+          </a:xfrm>
+          <a:prstGeom prst="rect">
+            <a:avLst/>
+          </a:prstGeom>
+        </p:spPr>
+      </p:pic>
+    </p:spTree>
+    <p:extLst>
+      <p:ext uri="{BB962C8B-B14F-4D97-AF65-F5344CB8AC3E}">
+        <p14:creationId xmlns:p14="http://schemas.microsoft.com/office/powerpoint/2010/main" val="2973672412"/>
+      </p:ext>
+    </p:extLst>
+  </p:cSld>
+  <p:clrMapOvr>
+    <a:masterClrMapping/>
+  </p:clrMapOvr>
+</p:sld>
+</file>
+
+<file path=ppt/slides/slide13.xml><?xml version="1.0" encoding="utf-8"?>
+<p:sld xmlns:a="http://schemas.openxmlformats.org/drawingml/2006/main" xmlns:r="http://schemas.openxmlformats.org/officeDocument/2006/relationships" xmlns:p="http://schemas.openxmlformats.org/presentationml/2006/main">
+  <p:cSld>
+    <p:spTree>
+      <p:nvGrpSpPr>
+        <p:cNvPr id="1" name=""/>
+        <p:cNvGrpSpPr/>
+        <p:nvPr/>
+      </p:nvGrpSpPr>
+      <p:grpSpPr>
+        <a:xfrm>
+          <a:off x="0" y="0"/>
+          <a:ext cx="0" cy="0"/>
+          <a:chOff x="0" y="0"/>
+          <a:chExt cx="0" cy="0"/>
+        </a:xfrm>
+      </p:grpSpPr>
+      <p:sp>
+        <p:nvSpPr>
+          <p:cNvPr id="2" name="Title 1"/>
+          <p:cNvSpPr>
+            <a:spLocks noGrp="1"/>
+          </p:cNvSpPr>
+          <p:nvPr>
+            <p:ph type="title"/>
+          </p:nvPr>
+        </p:nvSpPr>
+        <p:spPr/>
+        <p:txBody>
+          <a:bodyPr/>
+          <a:lstStyle/>
+          <a:p>
+            <a:r>
+              <a:rPr lang="en-US" dirty="0" smtClean="0"/>
+              <a:t>Pump setup</a:t>
+            </a:r>
+            <a:endParaRPr lang="en-US" dirty="0"/>
+          </a:p>
+        </p:txBody>
+      </p:sp>
+      <p:pic>
+        <p:nvPicPr>
+          <p:cNvPr id="3" name="Picture 2"/>
+          <p:cNvPicPr>
+            <a:picLocks noChangeAspect="1"/>
+          </p:cNvPicPr>
+          <p:nvPr/>
+        </p:nvPicPr>
+        <p:blipFill rotWithShape="1">
+          <a:blip r:embed="rId2"/>
+          <a:srcRect l="14012" t="10275" r="31685" b="69365"/>
+          <a:stretch/>
+        </p:blipFill>
+        <p:spPr>
+          <a:xfrm>
+            <a:off x="37175" y="1710083"/>
+            <a:ext cx="5115465" cy="1500997"/>
+          </a:xfrm>
+          <a:prstGeom prst="rect">
+            <a:avLst/>
+          </a:prstGeom>
+        </p:spPr>
+      </p:pic>
+      <p:pic>
+        <p:nvPicPr>
+          <p:cNvPr id="4" name="Picture 3"/>
+          <p:cNvPicPr>
+            <a:picLocks noChangeAspect="1"/>
+          </p:cNvPicPr>
+          <p:nvPr/>
+        </p:nvPicPr>
+        <p:blipFill rotWithShape="1">
+          <a:blip r:embed="rId3"/>
+          <a:srcRect l="14195" t="12615" r="32551" b="69786"/>
+          <a:stretch/>
+        </p:blipFill>
+        <p:spPr>
+          <a:xfrm>
+            <a:off x="5534871" y="1913625"/>
+            <a:ext cx="5016671" cy="1297455"/>
+          </a:xfrm>
+          <a:prstGeom prst="rect">
+            <a:avLst/>
+          </a:prstGeom>
+        </p:spPr>
+      </p:pic>
+      <p:pic>
+        <p:nvPicPr>
+          <p:cNvPr id="5" name="Picture 4"/>
+          <p:cNvPicPr>
+            <a:picLocks noChangeAspect="1"/>
+          </p:cNvPicPr>
+          <p:nvPr/>
+        </p:nvPicPr>
+        <p:blipFill>
+          <a:blip r:embed="rId4"/>
+          <a:stretch>
+            <a:fillRect/>
+          </a:stretch>
+        </p:blipFill>
+        <p:spPr>
+          <a:xfrm>
+            <a:off x="0" y="3318908"/>
+            <a:ext cx="9420225" cy="7372350"/>
+          </a:xfrm>
+          <a:prstGeom prst="rect">
+            <a:avLst/>
+          </a:prstGeom>
+        </p:spPr>
+      </p:pic>
+    </p:spTree>
+    <p:extLst>
+      <p:ext uri="{BB962C8B-B14F-4D97-AF65-F5344CB8AC3E}">
+        <p14:creationId xmlns:p14="http://schemas.microsoft.com/office/powerpoint/2010/main" val="2339460536"/>
+      </p:ext>
+    </p:extLst>
+  </p:cSld>
+  <p:clrMapOvr>
+    <a:masterClrMapping/>
+  </p:clrMapOvr>
+</p:sld>
+</file>
+
+<file path=ppt/slides/slide14.xml><?xml version="1.0" encoding="utf-8"?>
+<p:sld xmlns:a="http://schemas.openxmlformats.org/drawingml/2006/main" xmlns:r="http://schemas.openxmlformats.org/officeDocument/2006/relationships" xmlns:p="http://schemas.openxmlformats.org/presentationml/2006/main">
+  <p:cSld>
+    <p:spTree>
+      <p:nvGrpSpPr>
+        <p:cNvPr id="1" name=""/>
+        <p:cNvGrpSpPr/>
+        <p:nvPr/>
+      </p:nvGrpSpPr>
+      <p:grpSpPr>
+        <a:xfrm>
+          <a:off x="0" y="0"/>
+          <a:ext cx="0" cy="0"/>
+          <a:chOff x="0" y="0"/>
+          <a:chExt cx="0" cy="0"/>
+        </a:xfrm>
+      </p:grpSpPr>
+      <p:sp>
+        <p:nvSpPr>
+          <p:cNvPr id="2" name="Title 1"/>
+          <p:cNvSpPr>
+            <a:spLocks noGrp="1"/>
+          </p:cNvSpPr>
+          <p:nvPr>
+            <p:ph type="title"/>
+          </p:nvPr>
+        </p:nvSpPr>
+        <p:spPr/>
+        <p:txBody>
+          <a:bodyPr/>
+          <a:lstStyle/>
+          <a:p>
+            <a:r>
+              <a:rPr lang="en-US" dirty="0" smtClean="0"/>
+              <a:t>Filter, backwash, waste, repeat</a:t>
+            </a:r>
+            <a:endParaRPr lang="en-US" dirty="0"/>
+          </a:p>
+        </p:txBody>
+      </p:sp>
+      <p:pic>
+        <p:nvPicPr>
+          <p:cNvPr id="3" name="Picture 2"/>
+          <p:cNvPicPr>
+            <a:picLocks noChangeAspect="1"/>
+          </p:cNvPicPr>
+          <p:nvPr/>
+        </p:nvPicPr>
+        <p:blipFill rotWithShape="1">
+          <a:blip r:embed="rId2"/>
+          <a:srcRect l="916" t="5243" r="32051" b="57313"/>
+          <a:stretch/>
+        </p:blipFill>
+        <p:spPr>
+          <a:xfrm>
+            <a:off x="914399" y="2311878"/>
+            <a:ext cx="6314537" cy="2760453"/>
+          </a:xfrm>
+          <a:prstGeom prst="rect">
+            <a:avLst/>
+          </a:prstGeom>
+        </p:spPr>
+      </p:pic>
+    </p:spTree>
+    <p:extLst>
+      <p:ext uri="{BB962C8B-B14F-4D97-AF65-F5344CB8AC3E}">
+        <p14:creationId xmlns:p14="http://schemas.microsoft.com/office/powerpoint/2010/main" val="3532444510"/>
+      </p:ext>
+    </p:extLst>
+  </p:cSld>
+  <p:clrMapOvr>
+    <a:masterClrMapping/>
+  </p:clrMapOvr>
+</p:sld>
+</file>
+
+<file path=ppt/slides/slide15.xml><?xml version="1.0" encoding="utf-8"?>
+<p:sld xmlns:a="http://schemas.openxmlformats.org/drawingml/2006/main" xmlns:r="http://schemas.openxmlformats.org/officeDocument/2006/relationships" xmlns:p="http://schemas.openxmlformats.org/presentationml/2006/main">
+  <p:cSld>
+    <p:spTree>
+      <p:nvGrpSpPr>
+        <p:cNvPr id="1" name=""/>
+        <p:cNvGrpSpPr/>
+        <p:nvPr/>
+      </p:nvGrpSpPr>
+      <p:grpSpPr>
+        <a:xfrm>
+          <a:off x="0" y="0"/>
+          <a:ext cx="0" cy="0"/>
+          <a:chOff x="0" y="0"/>
+          <a:chExt cx="0" cy="0"/>
+        </a:xfrm>
+      </p:grpSpPr>
+      <p:sp>
+        <p:nvSpPr>
+          <p:cNvPr id="2" name="Title 1"/>
+          <p:cNvSpPr>
+            <a:spLocks noGrp="1"/>
+          </p:cNvSpPr>
+          <p:nvPr>
+            <p:ph type="title"/>
+          </p:nvPr>
+        </p:nvSpPr>
+        <p:spPr/>
+        <p:txBody>
+          <a:bodyPr/>
+          <a:lstStyle/>
+          <a:p>
+            <a:endParaRPr lang="en-US"/>
+          </a:p>
+        </p:txBody>
+      </p:sp>
+      <p:pic>
+        <p:nvPicPr>
+          <p:cNvPr id="3" name="Picture 2"/>
+          <p:cNvPicPr>
+            <a:picLocks noChangeAspect="1"/>
+          </p:cNvPicPr>
+          <p:nvPr/>
+        </p:nvPicPr>
+        <p:blipFill rotWithShape="1">
+          <a:blip r:embed="rId2"/>
+          <a:srcRect b="33905"/>
+          <a:stretch/>
+        </p:blipFill>
+        <p:spPr>
+          <a:xfrm>
+            <a:off x="-138113" y="-257175"/>
+            <a:ext cx="9420225" cy="4872718"/>
+          </a:xfrm>
+          <a:prstGeom prst="rect">
+            <a:avLst/>
+          </a:prstGeom>
+        </p:spPr>
+      </p:pic>
+    </p:spTree>
+    <p:extLst>
+      <p:ext uri="{BB962C8B-B14F-4D97-AF65-F5344CB8AC3E}">
+        <p14:creationId xmlns:p14="http://schemas.microsoft.com/office/powerpoint/2010/main" val="2607274405"/>
+      </p:ext>
+    </p:extLst>
+  </p:cSld>
+  <p:clrMapOvr>
+    <a:masterClrMapping/>
+  </p:clrMapOvr>
+</p:sld>
+</file>
+
+<file path=ppt/slides/slide16.xml><?xml version="1.0" encoding="utf-8"?>
+<p:sld xmlns:a="http://schemas.openxmlformats.org/drawingml/2006/main" xmlns:r="http://schemas.openxmlformats.org/officeDocument/2006/relationships" xmlns:p="http://schemas.openxmlformats.org/presentationml/2006/main">
+  <p:cSld>
+    <p:spTree>
+      <p:nvGrpSpPr>
+        <p:cNvPr id="1" name=""/>
+        <p:cNvGrpSpPr/>
+        <p:nvPr/>
+      </p:nvGrpSpPr>
+      <p:grpSpPr>
+        <a:xfrm>
+          <a:off x="0" y="0"/>
+          <a:ext cx="0" cy="0"/>
+          <a:chOff x="0" y="0"/>
+          <a:chExt cx="0" cy="0"/>
+        </a:xfrm>
+      </p:grpSpPr>
+      <p:sp>
+        <p:nvSpPr>
+          <p:cNvPr id="2" name="Title 1"/>
+          <p:cNvSpPr>
+            <a:spLocks noGrp="1"/>
+          </p:cNvSpPr>
+          <p:nvPr>
+            <p:ph type="title"/>
+          </p:nvPr>
+        </p:nvSpPr>
+        <p:spPr/>
+        <p:txBody>
+          <a:bodyPr/>
+          <a:lstStyle/>
+          <a:p>
+            <a:endParaRPr lang="en-US"/>
+          </a:p>
+        </p:txBody>
+      </p:sp>
+      <p:pic>
+        <p:nvPicPr>
+          <p:cNvPr id="3" name="Picture 2"/>
+          <p:cNvPicPr>
+            <a:picLocks noChangeAspect="1"/>
+          </p:cNvPicPr>
+          <p:nvPr/>
+        </p:nvPicPr>
+        <p:blipFill rotWithShape="1">
+          <a:blip r:embed="rId2"/>
+          <a:srcRect b="32429"/>
+          <a:stretch/>
+        </p:blipFill>
+        <p:spPr>
+          <a:xfrm>
+            <a:off x="-138113" y="-257175"/>
+            <a:ext cx="9420225" cy="4981575"/>
+          </a:xfrm>
+          <a:prstGeom prst="rect">
+            <a:avLst/>
+          </a:prstGeom>
+        </p:spPr>
+      </p:pic>
+    </p:spTree>
+    <p:extLst>
+      <p:ext uri="{BB962C8B-B14F-4D97-AF65-F5344CB8AC3E}">
+        <p14:creationId xmlns:p14="http://schemas.microsoft.com/office/powerpoint/2010/main" val="3193292795"/>
+      </p:ext>
+    </p:extLst>
+  </p:cSld>
+  <p:clrMapOvr>
+    <a:masterClrMapping/>
+  </p:clrMapOvr>
+</p:sld>
+</file>
+
 <file path=ppt/slides/slide2.xml><?xml version="1.0" encoding="utf-8"?>
 <p:sld xmlns:a="http://schemas.openxmlformats.org/drawingml/2006/main" xmlns:r="http://schemas.openxmlformats.org/officeDocument/2006/relationships" xmlns:p="http://schemas.openxmlformats.org/presentationml/2006/main">
   <p:cSld>
@@ -4704,31 +5319,12 @@
       </p:grpSpPr>
       <p:sp>
         <p:nvSpPr>
-          <p:cNvPr id="2" name="Title 1"/>
+          <p:cNvPr id="5" name="Title 4"/>
           <p:cNvSpPr>
             <a:spLocks noGrp="1"/>
           </p:cNvSpPr>
           <p:nvPr>
             <p:ph type="title"/>
-          </p:nvPr>
-        </p:nvSpPr>
-        <p:spPr/>
-        <p:txBody>
-          <a:bodyPr/>
-          <a:lstStyle/>
-          <a:p>
-            <a:endParaRPr lang="en-US"/>
-          </a:p>
-        </p:txBody>
-      </p:sp>
-      <p:sp>
-        <p:nvSpPr>
-          <p:cNvPr id="3" name="Content Placeholder 2"/>
-          <p:cNvSpPr>
-            <a:spLocks noGrp="1"/>
-          </p:cNvSpPr>
-          <p:nvPr>
-            <p:ph idx="1"/>
           </p:nvPr>
         </p:nvSpPr>
         <p:spPr/>
@@ -4849,7 +5445,7 @@
         </p:blipFill>
         <p:spPr>
           <a:xfrm>
-            <a:off x="3680460" y="2905125"/>
+            <a:off x="2990347" y="1904460"/>
             <a:ext cx="304800" cy="304800"/>
           </a:xfrm>
           <a:prstGeom prst="rect">
@@ -4873,7 +5469,7 @@
         </p:blipFill>
         <p:spPr>
           <a:xfrm>
-            <a:off x="3680460" y="3471862"/>
+            <a:off x="2990347" y="2471197"/>
             <a:ext cx="304800" cy="304800"/>
           </a:xfrm>
           <a:prstGeom prst="rect">
@@ -4897,7 +5493,7 @@
         </p:blipFill>
         <p:spPr>
           <a:xfrm>
-            <a:off x="3686651" y="4038599"/>
+            <a:off x="2996538" y="3037934"/>
             <a:ext cx="304800" cy="304800"/>
           </a:xfrm>
           <a:prstGeom prst="rect">
@@ -4921,7 +5517,7 @@
         </p:blipFill>
         <p:spPr>
           <a:xfrm>
-            <a:off x="3680460" y="4604385"/>
+            <a:off x="2990347" y="3603720"/>
             <a:ext cx="304800" cy="304800"/>
           </a:xfrm>
           <a:prstGeom prst="rect">
@@ -4945,7 +5541,7 @@
         </p:blipFill>
         <p:spPr>
           <a:xfrm>
-            <a:off x="5760720" y="3606288"/>
+            <a:off x="5070607" y="2605623"/>
             <a:ext cx="2286000" cy="1543050"/>
           </a:xfrm>
           <a:prstGeom prst="rect">
@@ -4969,7 +5565,7 @@
         </p:blipFill>
         <p:spPr>
           <a:xfrm>
-            <a:off x="1333500" y="3209925"/>
+            <a:off x="643387" y="2209260"/>
             <a:ext cx="762000" cy="219075"/>
           </a:xfrm>
           <a:prstGeom prst="rect">
@@ -4993,7 +5589,7 @@
         </p:blipFill>
         <p:spPr>
           <a:xfrm>
-            <a:off x="1333500" y="3451860"/>
+            <a:off x="643387" y="2451195"/>
             <a:ext cx="247650" cy="219075"/>
           </a:xfrm>
           <a:prstGeom prst="rect">
@@ -5017,7 +5613,7 @@
         </p:blipFill>
         <p:spPr>
           <a:xfrm>
-            <a:off x="1619250" y="3451859"/>
+            <a:off x="929137" y="2451194"/>
             <a:ext cx="247650" cy="219075"/>
           </a:xfrm>
           <a:prstGeom prst="rect">
@@ -5041,7 +5637,7 @@
         </p:blipFill>
         <p:spPr>
           <a:xfrm>
-            <a:off x="1905000" y="3471862"/>
+            <a:off x="1214887" y="2471197"/>
             <a:ext cx="247650" cy="219075"/>
           </a:xfrm>
           <a:prstGeom prst="rect">
@@ -5065,7 +5661,7 @@
         </p:blipFill>
         <p:spPr>
           <a:xfrm>
-            <a:off x="1866900" y="4038600"/>
+            <a:off x="1176787" y="3037935"/>
             <a:ext cx="304800" cy="304800"/>
           </a:xfrm>
           <a:prstGeom prst="rect">
@@ -5089,7 +5685,7 @@
         </p:blipFill>
         <p:spPr>
           <a:xfrm>
-            <a:off x="1253490" y="4909185"/>
+            <a:off x="563377" y="3908520"/>
             <a:ext cx="304800" cy="304800"/>
           </a:xfrm>
           <a:prstGeom prst="rect">
@@ -5113,7 +5709,7 @@
         </p:blipFill>
         <p:spPr>
           <a:xfrm>
-            <a:off x="1682115" y="4909185"/>
+            <a:off x="992002" y="3908520"/>
             <a:ext cx="314325" cy="304800"/>
           </a:xfrm>
           <a:prstGeom prst="rect">
@@ -5137,8 +5733,56 @@
         </p:blipFill>
         <p:spPr>
           <a:xfrm>
-            <a:off x="2113597" y="4922520"/>
+            <a:off x="1423484" y="3921855"/>
             <a:ext cx="314325" cy="304800"/>
+          </a:xfrm>
+          <a:prstGeom prst="rect">
+            <a:avLst/>
+          </a:prstGeom>
+        </p:spPr>
+      </p:pic>
+      <p:pic>
+        <p:nvPicPr>
+          <p:cNvPr id="3" name="Picture 2"/>
+          <p:cNvPicPr>
+            <a:picLocks noChangeAspect="1"/>
+          </p:cNvPicPr>
+          <p:nvPr/>
+        </p:nvPicPr>
+        <p:blipFill>
+          <a:blip r:embed="rId15"/>
+          <a:stretch>
+            <a:fillRect/>
+          </a:stretch>
+        </p:blipFill>
+        <p:spPr>
+          <a:xfrm>
+            <a:off x="2212137" y="4367748"/>
+            <a:ext cx="6686550" cy="4524375"/>
+          </a:xfrm>
+          <a:prstGeom prst="rect">
+            <a:avLst/>
+          </a:prstGeom>
+        </p:spPr>
+      </p:pic>
+      <p:pic>
+        <p:nvPicPr>
+          <p:cNvPr id="4" name="Picture 3"/>
+          <p:cNvPicPr>
+            <a:picLocks noChangeAspect="1"/>
+          </p:cNvPicPr>
+          <p:nvPr/>
+        </p:nvPicPr>
+        <p:blipFill>
+          <a:blip r:embed="rId16"/>
+          <a:stretch>
+            <a:fillRect/>
+          </a:stretch>
+        </p:blipFill>
+        <p:spPr>
+          <a:xfrm>
+            <a:off x="8155736" y="3908520"/>
+            <a:ext cx="6686550" cy="4524375"/>
           </a:xfrm>
           <a:prstGeom prst="rect">
             <a:avLst/>
@@ -5589,6 +6233,29 @@
           </a:prstGeom>
         </p:spPr>
       </p:pic>
+      <p:pic>
+        <p:nvPicPr>
+          <p:cNvPr id="3" name="Picture 2"/>
+          <p:cNvPicPr>
+            <a:picLocks noChangeAspect="1"/>
+          </p:cNvPicPr>
+          <p:nvPr/>
+        </p:nvPicPr>
+        <p:blipFill rotWithShape="1">
+          <a:blip r:embed="rId18"/>
+          <a:srcRect l="41998" t="11823" r="30534" b="81410"/>
+          <a:stretch/>
+        </p:blipFill>
+        <p:spPr>
+          <a:xfrm>
+            <a:off x="5186362" y="2385923"/>
+            <a:ext cx="1216984" cy="305519"/>
+          </a:xfrm>
+          <a:prstGeom prst="rect">
+            <a:avLst/>
+          </a:prstGeom>
+        </p:spPr>
+      </p:pic>
     </p:spTree>
     <p:extLst>
       <p:ext uri="{BB962C8B-B14F-4D97-AF65-F5344CB8AC3E}">
@@ -6194,6 +6861,156 @@
       </p:par>
     </p:tnLst>
   </p:timing>
+</p:sld>
+</file>
+
+<file path=ppt/slides/slide8.xml><?xml version="1.0" encoding="utf-8"?>
+<p:sld xmlns:a="http://schemas.openxmlformats.org/drawingml/2006/main" xmlns:r="http://schemas.openxmlformats.org/officeDocument/2006/relationships" xmlns:p="http://schemas.openxmlformats.org/presentationml/2006/main">
+  <p:cSld>
+    <p:spTree>
+      <p:nvGrpSpPr>
+        <p:cNvPr id="1" name=""/>
+        <p:cNvGrpSpPr/>
+        <p:nvPr/>
+      </p:nvGrpSpPr>
+      <p:grpSpPr>
+        <a:xfrm>
+          <a:off x="0" y="0"/>
+          <a:ext cx="0" cy="0"/>
+          <a:chOff x="0" y="0"/>
+          <a:chExt cx="0" cy="0"/>
+        </a:xfrm>
+      </p:grpSpPr>
+      <p:sp>
+        <p:nvSpPr>
+          <p:cNvPr id="2" name="Title 1"/>
+          <p:cNvSpPr>
+            <a:spLocks noGrp="1"/>
+          </p:cNvSpPr>
+          <p:nvPr>
+            <p:ph type="title"/>
+          </p:nvPr>
+        </p:nvSpPr>
+        <p:spPr/>
+        <p:txBody>
+          <a:bodyPr/>
+          <a:lstStyle/>
+          <a:p>
+            <a:r>
+              <a:rPr lang="en-US" dirty="0" smtClean="0"/>
+              <a:t>logic</a:t>
+            </a:r>
+            <a:endParaRPr lang="en-US" dirty="0"/>
+          </a:p>
+        </p:txBody>
+      </p:sp>
+      <p:pic>
+        <p:nvPicPr>
+          <p:cNvPr id="4" name="Picture 3"/>
+          <p:cNvPicPr>
+            <a:picLocks noChangeAspect="1"/>
+          </p:cNvPicPr>
+          <p:nvPr/>
+        </p:nvPicPr>
+        <p:blipFill>
+          <a:blip r:embed="rId2"/>
+          <a:stretch>
+            <a:fillRect/>
+          </a:stretch>
+        </p:blipFill>
+        <p:spPr>
+          <a:xfrm>
+            <a:off x="-19050" y="61912"/>
+            <a:ext cx="9182100" cy="6734175"/>
+          </a:xfrm>
+          <a:prstGeom prst="rect">
+            <a:avLst/>
+          </a:prstGeom>
+        </p:spPr>
+      </p:pic>
+    </p:spTree>
+    <p:extLst>
+      <p:ext uri="{BB962C8B-B14F-4D97-AF65-F5344CB8AC3E}">
+        <p14:creationId xmlns:p14="http://schemas.microsoft.com/office/powerpoint/2010/main" val="953437860"/>
+      </p:ext>
+    </p:extLst>
+  </p:cSld>
+  <p:clrMapOvr>
+    <a:masterClrMapping/>
+  </p:clrMapOvr>
+</p:sld>
+</file>
+
+<file path=ppt/slides/slide9.xml><?xml version="1.0" encoding="utf-8"?>
+<p:sld xmlns:a="http://schemas.openxmlformats.org/drawingml/2006/main" xmlns:r="http://schemas.openxmlformats.org/officeDocument/2006/relationships" xmlns:p="http://schemas.openxmlformats.org/presentationml/2006/main">
+  <p:cSld>
+    <p:spTree>
+      <p:nvGrpSpPr>
+        <p:cNvPr id="1" name=""/>
+        <p:cNvGrpSpPr/>
+        <p:nvPr/>
+      </p:nvGrpSpPr>
+      <p:grpSpPr>
+        <a:xfrm>
+          <a:off x="0" y="0"/>
+          <a:ext cx="0" cy="0"/>
+          <a:chOff x="0" y="0"/>
+          <a:chExt cx="0" cy="0"/>
+        </a:xfrm>
+      </p:grpSpPr>
+      <p:sp>
+        <p:nvSpPr>
+          <p:cNvPr id="2" name="Title 1"/>
+          <p:cNvSpPr>
+            <a:spLocks noGrp="1"/>
+          </p:cNvSpPr>
+          <p:nvPr>
+            <p:ph type="title"/>
+          </p:nvPr>
+        </p:nvSpPr>
+        <p:spPr/>
+        <p:txBody>
+          <a:bodyPr/>
+          <a:lstStyle/>
+          <a:p>
+            <a:endParaRPr lang="en-US"/>
+          </a:p>
+        </p:txBody>
+      </p:sp>
+      <p:pic>
+        <p:nvPicPr>
+          <p:cNvPr id="3" name="Picture 2"/>
+          <p:cNvPicPr>
+            <a:picLocks noChangeAspect="1"/>
+          </p:cNvPicPr>
+          <p:nvPr/>
+        </p:nvPicPr>
+        <p:blipFill>
+          <a:blip r:embed="rId2"/>
+          <a:stretch>
+            <a:fillRect/>
+          </a:stretch>
+        </p:blipFill>
+        <p:spPr>
+          <a:xfrm>
+            <a:off x="0" y="-115661"/>
+            <a:ext cx="9420225" cy="7372350"/>
+          </a:xfrm>
+          <a:prstGeom prst="rect">
+            <a:avLst/>
+          </a:prstGeom>
+        </p:spPr>
+      </p:pic>
+    </p:spTree>
+    <p:extLst>
+      <p:ext uri="{BB962C8B-B14F-4D97-AF65-F5344CB8AC3E}">
+        <p14:creationId xmlns:p14="http://schemas.microsoft.com/office/powerpoint/2010/main" val="2841437757"/>
+      </p:ext>
+    </p:extLst>
+  </p:cSld>
+  <p:clrMapOvr>
+    <a:masterClrMapping/>
+  </p:clrMapOvr>
 </p:sld>
 </file>
 

</xml_diff>